<commit_message>
comp: hierarchy tree view
</commit_message>
<xml_diff>
--- a/code/languages/org.iets3.core/languages/org.iets3.components.core/icons/icons.pptx
+++ b/code/languages/org.iets3.core/languages/org.iets3.components.core/icons/icons.pptx
@@ -285,7 +285,7 @@
           <a:lstStyle/>
           <a:p>
             <a:fld id="{CFFD64F9-81CB-D544-9A9C-B48F900B5B35}" type="datetimeFigureOut">
-              <a:t>17/12/15</a:t>
+              <a:t>20/12/15</a:t>
             </a:fld>
             <a:endParaRPr lang="de-DE"/>
           </a:p>
@@ -451,7 +451,7 @@
           <a:lstStyle/>
           <a:p>
             <a:fld id="{CFFD64F9-81CB-D544-9A9C-B48F900B5B35}" type="datetimeFigureOut">
-              <a:t>17/12/15</a:t>
+              <a:t>20/12/15</a:t>
             </a:fld>
             <a:endParaRPr lang="de-DE"/>
           </a:p>
@@ -627,7 +627,7 @@
           <a:lstStyle/>
           <a:p>
             <a:fld id="{CFFD64F9-81CB-D544-9A9C-B48F900B5B35}" type="datetimeFigureOut">
-              <a:t>17/12/15</a:t>
+              <a:t>20/12/15</a:t>
             </a:fld>
             <a:endParaRPr lang="de-DE"/>
           </a:p>
@@ -793,7 +793,7 @@
           <a:lstStyle/>
           <a:p>
             <a:fld id="{CFFD64F9-81CB-D544-9A9C-B48F900B5B35}" type="datetimeFigureOut">
-              <a:t>17/12/15</a:t>
+              <a:t>20/12/15</a:t>
             </a:fld>
             <a:endParaRPr lang="de-DE"/>
           </a:p>
@@ -1036,7 +1036,7 @@
           <a:lstStyle/>
           <a:p>
             <a:fld id="{CFFD64F9-81CB-D544-9A9C-B48F900B5B35}" type="datetimeFigureOut">
-              <a:t>17/12/15</a:t>
+              <a:t>20/12/15</a:t>
             </a:fld>
             <a:endParaRPr lang="de-DE"/>
           </a:p>
@@ -1319,7 +1319,7 @@
           <a:lstStyle/>
           <a:p>
             <a:fld id="{CFFD64F9-81CB-D544-9A9C-B48F900B5B35}" type="datetimeFigureOut">
-              <a:t>17/12/15</a:t>
+              <a:t>20/12/15</a:t>
             </a:fld>
             <a:endParaRPr lang="de-DE"/>
           </a:p>
@@ -1736,7 +1736,7 @@
           <a:lstStyle/>
           <a:p>
             <a:fld id="{CFFD64F9-81CB-D544-9A9C-B48F900B5B35}" type="datetimeFigureOut">
-              <a:t>17/12/15</a:t>
+              <a:t>20/12/15</a:t>
             </a:fld>
             <a:endParaRPr lang="de-DE"/>
           </a:p>
@@ -1851,7 +1851,7 @@
           <a:lstStyle/>
           <a:p>
             <a:fld id="{CFFD64F9-81CB-D544-9A9C-B48F900B5B35}" type="datetimeFigureOut">
-              <a:t>17/12/15</a:t>
+              <a:t>20/12/15</a:t>
             </a:fld>
             <a:endParaRPr lang="de-DE"/>
           </a:p>
@@ -1944,7 +1944,7 @@
           <a:lstStyle/>
           <a:p>
             <a:fld id="{CFFD64F9-81CB-D544-9A9C-B48F900B5B35}" type="datetimeFigureOut">
-              <a:t>17/12/15</a:t>
+              <a:t>20/12/15</a:t>
             </a:fld>
             <a:endParaRPr lang="de-DE"/>
           </a:p>
@@ -2217,7 +2217,7 @@
           <a:lstStyle/>
           <a:p>
             <a:fld id="{CFFD64F9-81CB-D544-9A9C-B48F900B5B35}" type="datetimeFigureOut">
-              <a:t>17/12/15</a:t>
+              <a:t>20/12/15</a:t>
             </a:fld>
             <a:endParaRPr lang="de-DE"/>
           </a:p>
@@ -2467,7 +2467,7 @@
           <a:lstStyle/>
           <a:p>
             <a:fld id="{CFFD64F9-81CB-D544-9A9C-B48F900B5B35}" type="datetimeFigureOut">
-              <a:t>17/12/15</a:t>
+              <a:t>20/12/15</a:t>
             </a:fld>
             <a:endParaRPr lang="de-DE"/>
           </a:p>
@@ -2676,7 +2676,7 @@
           </a:lstStyle>
           <a:p>
             <a:fld id="{CFFD64F9-81CB-D544-9A9C-B48F900B5B35}" type="datetimeFigureOut">
-              <a:t>17/12/15</a:t>
+              <a:t>20/12/15</a:t>
             </a:fld>
             <a:endParaRPr lang="de-DE"/>
           </a:p>
@@ -3328,6 +3328,506 @@
                 </a:solidFill>
               </a:rPr>
               <a:t>C</a:t>
+            </a:r>
+          </a:p>
+        </p:txBody>
+      </p:sp>
+      <p:sp>
+        <p:nvSpPr>
+          <p:cNvPr id="9" name="Rechteck 8"/>
+          <p:cNvSpPr/>
+          <p:nvPr/>
+        </p:nvSpPr>
+        <p:spPr>
+          <a:xfrm>
+            <a:off x="5174204" y="3035654"/>
+            <a:ext cx="1277597" cy="1277597"/>
+          </a:xfrm>
+          <a:prstGeom prst="rect">
+            <a:avLst/>
+          </a:prstGeom>
+          <a:noFill/>
+          <a:ln>
+            <a:solidFill>
+              <a:schemeClr val="tx1"/>
+            </a:solidFill>
+          </a:ln>
+          <a:effectLst/>
+        </p:spPr>
+        <p:style>
+          <a:lnRef idx="1">
+            <a:schemeClr val="accent1"/>
+          </a:lnRef>
+          <a:fillRef idx="3">
+            <a:schemeClr val="accent1"/>
+          </a:fillRef>
+          <a:effectRef idx="2">
+            <a:schemeClr val="accent1"/>
+          </a:effectRef>
+          <a:fontRef idx="minor">
+            <a:schemeClr val="lt1"/>
+          </a:fontRef>
+        </p:style>
+        <p:txBody>
+          <a:bodyPr rtlCol="0" anchor="ctr"/>
+          <a:lstStyle/>
+          <a:p>
+            <a:pPr algn="ctr"/>
+            <a:endParaRPr lang="de-DE"/>
+          </a:p>
+        </p:txBody>
+      </p:sp>
+      <p:sp>
+        <p:nvSpPr>
+          <p:cNvPr id="10" name="Oval 9"/>
+          <p:cNvSpPr/>
+          <p:nvPr/>
+        </p:nvSpPr>
+        <p:spPr>
+          <a:xfrm>
+            <a:off x="5346275" y="3207757"/>
+            <a:ext cx="941050" cy="941050"/>
+          </a:xfrm>
+          <a:prstGeom prst="ellipse">
+            <a:avLst/>
+          </a:prstGeom>
+          <a:solidFill>
+            <a:srgbClr val="000090">
+              <a:alpha val="51000"/>
+            </a:srgbClr>
+          </a:solidFill>
+          <a:ln>
+            <a:noFill/>
+          </a:ln>
+          <a:effectLst/>
+        </p:spPr>
+        <p:style>
+          <a:lnRef idx="1">
+            <a:schemeClr val="accent1"/>
+          </a:lnRef>
+          <a:fillRef idx="3">
+            <a:schemeClr val="accent1"/>
+          </a:fillRef>
+          <a:effectRef idx="2">
+            <a:schemeClr val="accent1"/>
+          </a:effectRef>
+          <a:fontRef idx="minor">
+            <a:schemeClr val="lt1"/>
+          </a:fontRef>
+        </p:style>
+        <p:txBody>
+          <a:bodyPr rtlCol="0" anchor="ctr"/>
+          <a:lstStyle/>
+          <a:p>
+            <a:pPr algn="ctr"/>
+            <a:endParaRPr lang="de-DE"/>
+          </a:p>
+        </p:txBody>
+      </p:sp>
+      <p:sp>
+        <p:nvSpPr>
+          <p:cNvPr id="11" name="Textfeld 10"/>
+          <p:cNvSpPr txBox="1"/>
+          <p:nvPr/>
+        </p:nvSpPr>
+        <p:spPr>
+          <a:xfrm>
+            <a:off x="5608108" y="3011988"/>
+            <a:ext cx="430827" cy="1200329"/>
+          </a:xfrm>
+          <a:prstGeom prst="rect">
+            <a:avLst/>
+          </a:prstGeom>
+          <a:noFill/>
+        </p:spPr>
+        <p:txBody>
+          <a:bodyPr wrap="none" rtlCol="0">
+            <a:spAutoFit/>
+          </a:bodyPr>
+          <a:lstStyle/>
+          <a:p>
+            <a:r>
+              <a:rPr lang="de-DE" sz="7200" b="1">
+                <a:solidFill>
+                  <a:schemeClr val="bg1"/>
+                </a:solidFill>
+              </a:rPr>
+              <a:t>I</a:t>
+            </a:r>
+          </a:p>
+        </p:txBody>
+      </p:sp>
+      <p:sp>
+        <p:nvSpPr>
+          <p:cNvPr id="12" name="Rechteck 11"/>
+          <p:cNvSpPr/>
+          <p:nvPr/>
+        </p:nvSpPr>
+        <p:spPr>
+          <a:xfrm>
+            <a:off x="3744207" y="4595057"/>
+            <a:ext cx="1277597" cy="1277597"/>
+          </a:xfrm>
+          <a:prstGeom prst="rect">
+            <a:avLst/>
+          </a:prstGeom>
+          <a:noFill/>
+          <a:ln>
+            <a:solidFill>
+              <a:schemeClr val="tx1"/>
+            </a:solidFill>
+          </a:ln>
+          <a:effectLst/>
+        </p:spPr>
+        <p:style>
+          <a:lnRef idx="1">
+            <a:schemeClr val="accent1"/>
+          </a:lnRef>
+          <a:fillRef idx="3">
+            <a:schemeClr val="accent1"/>
+          </a:fillRef>
+          <a:effectRef idx="2">
+            <a:schemeClr val="accent1"/>
+          </a:effectRef>
+          <a:fontRef idx="minor">
+            <a:schemeClr val="lt1"/>
+          </a:fontRef>
+        </p:style>
+        <p:txBody>
+          <a:bodyPr rtlCol="0" anchor="ctr"/>
+          <a:lstStyle/>
+          <a:p>
+            <a:pPr algn="ctr"/>
+            <a:endParaRPr lang="de-DE"/>
+          </a:p>
+        </p:txBody>
+      </p:sp>
+      <p:sp>
+        <p:nvSpPr>
+          <p:cNvPr id="4" name="Rechteck 3"/>
+          <p:cNvSpPr/>
+          <p:nvPr/>
+        </p:nvSpPr>
+        <p:spPr>
+          <a:xfrm>
+            <a:off x="3986234" y="4824011"/>
+            <a:ext cx="813206" cy="813206"/>
+          </a:xfrm>
+          <a:prstGeom prst="rect">
+            <a:avLst/>
+          </a:prstGeom>
+          <a:solidFill>
+            <a:schemeClr val="bg1">
+              <a:lumMod val="50000"/>
+            </a:schemeClr>
+          </a:solidFill>
+          <a:ln>
+            <a:noFill/>
+          </a:ln>
+          <a:effectLst/>
+        </p:spPr>
+        <p:style>
+          <a:lnRef idx="1">
+            <a:schemeClr val="accent1"/>
+          </a:lnRef>
+          <a:fillRef idx="3">
+            <a:schemeClr val="accent1"/>
+          </a:fillRef>
+          <a:effectRef idx="2">
+            <a:schemeClr val="accent1"/>
+          </a:effectRef>
+          <a:fontRef idx="minor">
+            <a:schemeClr val="lt1"/>
+          </a:fontRef>
+        </p:style>
+        <p:txBody>
+          <a:bodyPr rtlCol="0" anchor="ctr"/>
+          <a:lstStyle/>
+          <a:p>
+            <a:pPr algn="ctr"/>
+            <a:endParaRPr lang="de-DE"/>
+          </a:p>
+        </p:txBody>
+      </p:sp>
+      <p:sp>
+        <p:nvSpPr>
+          <p:cNvPr id="19" name="Textfeld 18"/>
+          <p:cNvSpPr txBox="1"/>
+          <p:nvPr/>
+        </p:nvSpPr>
+        <p:spPr>
+          <a:xfrm>
+            <a:off x="4062197" y="4503697"/>
+            <a:ext cx="649487" cy="1200329"/>
+          </a:xfrm>
+          <a:prstGeom prst="rect">
+            <a:avLst/>
+          </a:prstGeom>
+          <a:noFill/>
+        </p:spPr>
+        <p:txBody>
+          <a:bodyPr wrap="none" rtlCol="0">
+            <a:spAutoFit/>
+          </a:bodyPr>
+          <a:lstStyle/>
+          <a:p>
+            <a:r>
+              <a:rPr lang="de-DE" sz="7200" b="1">
+                <a:solidFill>
+                  <a:schemeClr val="bg1"/>
+                </a:solidFill>
+              </a:rPr>
+              <a:t>e</a:t>
+            </a:r>
+          </a:p>
+        </p:txBody>
+      </p:sp>
+      <p:sp>
+        <p:nvSpPr>
+          <p:cNvPr id="20" name="Rechteck 19"/>
+          <p:cNvSpPr/>
+          <p:nvPr/>
+        </p:nvSpPr>
+        <p:spPr>
+          <a:xfrm>
+            <a:off x="5148064" y="4590264"/>
+            <a:ext cx="1277597" cy="1277597"/>
+          </a:xfrm>
+          <a:prstGeom prst="rect">
+            <a:avLst/>
+          </a:prstGeom>
+          <a:noFill/>
+          <a:ln>
+            <a:solidFill>
+              <a:schemeClr val="tx1"/>
+            </a:solidFill>
+          </a:ln>
+          <a:effectLst/>
+        </p:spPr>
+        <p:style>
+          <a:lnRef idx="1">
+            <a:schemeClr val="accent1"/>
+          </a:lnRef>
+          <a:fillRef idx="3">
+            <a:schemeClr val="accent1"/>
+          </a:fillRef>
+          <a:effectRef idx="2">
+            <a:schemeClr val="accent1"/>
+          </a:effectRef>
+          <a:fontRef idx="minor">
+            <a:schemeClr val="lt1"/>
+          </a:fontRef>
+        </p:style>
+        <p:txBody>
+          <a:bodyPr rtlCol="0" anchor="ctr"/>
+          <a:lstStyle/>
+          <a:p>
+            <a:pPr algn="ctr"/>
+            <a:endParaRPr lang="de-DE"/>
+          </a:p>
+        </p:txBody>
+      </p:sp>
+      <p:sp>
+        <p:nvSpPr>
+          <p:cNvPr id="21" name="Rechteck 20"/>
+          <p:cNvSpPr/>
+          <p:nvPr/>
+        </p:nvSpPr>
+        <p:spPr>
+          <a:xfrm>
+            <a:off x="5390091" y="4819218"/>
+            <a:ext cx="813206" cy="813206"/>
+          </a:xfrm>
+          <a:prstGeom prst="rect">
+            <a:avLst/>
+          </a:prstGeom>
+          <a:solidFill>
+            <a:schemeClr val="bg1">
+              <a:lumMod val="50000"/>
+            </a:schemeClr>
+          </a:solidFill>
+          <a:ln>
+            <a:noFill/>
+          </a:ln>
+          <a:effectLst/>
+        </p:spPr>
+        <p:style>
+          <a:lnRef idx="1">
+            <a:schemeClr val="accent1"/>
+          </a:lnRef>
+          <a:fillRef idx="3">
+            <a:schemeClr val="accent1"/>
+          </a:fillRef>
+          <a:effectRef idx="2">
+            <a:schemeClr val="accent1"/>
+          </a:effectRef>
+          <a:fontRef idx="minor">
+            <a:schemeClr val="lt1"/>
+          </a:fontRef>
+        </p:style>
+        <p:txBody>
+          <a:bodyPr rtlCol="0" anchor="ctr"/>
+          <a:lstStyle/>
+          <a:p>
+            <a:pPr algn="ctr"/>
+            <a:endParaRPr lang="de-DE"/>
+          </a:p>
+        </p:txBody>
+      </p:sp>
+      <p:sp>
+        <p:nvSpPr>
+          <p:cNvPr id="22" name="Textfeld 21"/>
+          <p:cNvSpPr txBox="1"/>
+          <p:nvPr/>
+        </p:nvSpPr>
+        <p:spPr>
+          <a:xfrm>
+            <a:off x="5575698" y="4526312"/>
+            <a:ext cx="411441" cy="1200329"/>
+          </a:xfrm>
+          <a:prstGeom prst="rect">
+            <a:avLst/>
+          </a:prstGeom>
+          <a:noFill/>
+        </p:spPr>
+        <p:txBody>
+          <a:bodyPr wrap="none" rtlCol="0">
+            <a:spAutoFit/>
+          </a:bodyPr>
+          <a:lstStyle/>
+          <a:p>
+            <a:r>
+              <a:rPr lang="de-DE" sz="7200" b="1">
+                <a:solidFill>
+                  <a:schemeClr val="bg1"/>
+                </a:solidFill>
+              </a:rPr>
+              <a:t>i</a:t>
+            </a:r>
+          </a:p>
+        </p:txBody>
+      </p:sp>
+      <p:sp>
+        <p:nvSpPr>
+          <p:cNvPr id="23" name="Rechteck 22"/>
+          <p:cNvSpPr/>
+          <p:nvPr/>
+        </p:nvSpPr>
+        <p:spPr>
+          <a:xfrm>
+            <a:off x="2206234" y="4590264"/>
+            <a:ext cx="1277597" cy="1277597"/>
+          </a:xfrm>
+          <a:prstGeom prst="rect">
+            <a:avLst/>
+          </a:prstGeom>
+          <a:noFill/>
+          <a:ln>
+            <a:solidFill>
+              <a:schemeClr val="tx1"/>
+            </a:solidFill>
+          </a:ln>
+          <a:effectLst/>
+        </p:spPr>
+        <p:style>
+          <a:lnRef idx="1">
+            <a:schemeClr val="accent1"/>
+          </a:lnRef>
+          <a:fillRef idx="3">
+            <a:schemeClr val="accent1"/>
+          </a:fillRef>
+          <a:effectRef idx="2">
+            <a:schemeClr val="accent1"/>
+          </a:effectRef>
+          <a:fontRef idx="minor">
+            <a:schemeClr val="lt1"/>
+          </a:fontRef>
+        </p:style>
+        <p:txBody>
+          <a:bodyPr rtlCol="0" anchor="ctr"/>
+          <a:lstStyle/>
+          <a:p>
+            <a:pPr algn="ctr"/>
+            <a:endParaRPr lang="de-DE"/>
+          </a:p>
+        </p:txBody>
+      </p:sp>
+      <p:sp>
+        <p:nvSpPr>
+          <p:cNvPr id="24" name="Rechteck 23"/>
+          <p:cNvSpPr/>
+          <p:nvPr/>
+        </p:nvSpPr>
+        <p:spPr>
+          <a:xfrm>
+            <a:off x="2448261" y="4819218"/>
+            <a:ext cx="813206" cy="813206"/>
+          </a:xfrm>
+          <a:prstGeom prst="rect">
+            <a:avLst/>
+          </a:prstGeom>
+          <a:solidFill>
+            <a:schemeClr val="bg1">
+              <a:lumMod val="50000"/>
+            </a:schemeClr>
+          </a:solidFill>
+          <a:ln>
+            <a:noFill/>
+          </a:ln>
+          <a:effectLst/>
+        </p:spPr>
+        <p:style>
+          <a:lnRef idx="1">
+            <a:schemeClr val="accent1"/>
+          </a:lnRef>
+          <a:fillRef idx="3">
+            <a:schemeClr val="accent1"/>
+          </a:fillRef>
+          <a:effectRef idx="2">
+            <a:schemeClr val="accent1"/>
+          </a:effectRef>
+          <a:fontRef idx="minor">
+            <a:schemeClr val="lt1"/>
+          </a:fontRef>
+        </p:style>
+        <p:txBody>
+          <a:bodyPr rtlCol="0" anchor="ctr"/>
+          <a:lstStyle/>
+          <a:p>
+            <a:pPr algn="ctr"/>
+            <a:endParaRPr lang="de-DE"/>
+          </a:p>
+        </p:txBody>
+      </p:sp>
+      <p:sp>
+        <p:nvSpPr>
+          <p:cNvPr id="25" name="Textfeld 24"/>
+          <p:cNvSpPr txBox="1"/>
+          <p:nvPr/>
+        </p:nvSpPr>
+        <p:spPr>
+          <a:xfrm>
+            <a:off x="2542498" y="4498904"/>
+            <a:ext cx="571040" cy="1200329"/>
+          </a:xfrm>
+          <a:prstGeom prst="rect">
+            <a:avLst/>
+          </a:prstGeom>
+          <a:noFill/>
+        </p:spPr>
+        <p:txBody>
+          <a:bodyPr wrap="none" rtlCol="0">
+            <a:spAutoFit/>
+          </a:bodyPr>
+          <a:lstStyle/>
+          <a:p>
+            <a:r>
+              <a:rPr lang="de-DE" sz="7200" b="1">
+                <a:solidFill>
+                  <a:schemeClr val="bg1"/>
+                </a:solidFill>
+              </a:rPr>
+              <a:t>c</a:t>
             </a:r>
           </a:p>
         </p:txBody>

</xml_diff>

<commit_message>
data items and bundles refactored
</commit_message>
<xml_diff>
--- a/code/languages/org.iets3.core/languages/org.iets3.components.core/icons/icons.pptx
+++ b/code/languages/org.iets3.core/languages/org.iets3.components.core/icons/icons.pptx
@@ -285,7 +285,7 @@
           <a:lstStyle/>
           <a:p>
             <a:fld id="{CFFD64F9-81CB-D544-9A9C-B48F900B5B35}" type="datetimeFigureOut">
-              <a:t>20/12/15</a:t>
+              <a:t>21/12/15</a:t>
             </a:fld>
             <a:endParaRPr lang="de-DE"/>
           </a:p>
@@ -451,7 +451,7 @@
           <a:lstStyle/>
           <a:p>
             <a:fld id="{CFFD64F9-81CB-D544-9A9C-B48F900B5B35}" type="datetimeFigureOut">
-              <a:t>20/12/15</a:t>
+              <a:t>21/12/15</a:t>
             </a:fld>
             <a:endParaRPr lang="de-DE"/>
           </a:p>
@@ -627,7 +627,7 @@
           <a:lstStyle/>
           <a:p>
             <a:fld id="{CFFD64F9-81CB-D544-9A9C-B48F900B5B35}" type="datetimeFigureOut">
-              <a:t>20/12/15</a:t>
+              <a:t>21/12/15</a:t>
             </a:fld>
             <a:endParaRPr lang="de-DE"/>
           </a:p>
@@ -793,7 +793,7 @@
           <a:lstStyle/>
           <a:p>
             <a:fld id="{CFFD64F9-81CB-D544-9A9C-B48F900B5B35}" type="datetimeFigureOut">
-              <a:t>20/12/15</a:t>
+              <a:t>21/12/15</a:t>
             </a:fld>
             <a:endParaRPr lang="de-DE"/>
           </a:p>
@@ -1036,7 +1036,7 @@
           <a:lstStyle/>
           <a:p>
             <a:fld id="{CFFD64F9-81CB-D544-9A9C-B48F900B5B35}" type="datetimeFigureOut">
-              <a:t>20/12/15</a:t>
+              <a:t>21/12/15</a:t>
             </a:fld>
             <a:endParaRPr lang="de-DE"/>
           </a:p>
@@ -1319,7 +1319,7 @@
           <a:lstStyle/>
           <a:p>
             <a:fld id="{CFFD64F9-81CB-D544-9A9C-B48F900B5B35}" type="datetimeFigureOut">
-              <a:t>20/12/15</a:t>
+              <a:t>21/12/15</a:t>
             </a:fld>
             <a:endParaRPr lang="de-DE"/>
           </a:p>
@@ -1736,7 +1736,7 @@
           <a:lstStyle/>
           <a:p>
             <a:fld id="{CFFD64F9-81CB-D544-9A9C-B48F900B5B35}" type="datetimeFigureOut">
-              <a:t>20/12/15</a:t>
+              <a:t>21/12/15</a:t>
             </a:fld>
             <a:endParaRPr lang="de-DE"/>
           </a:p>
@@ -1851,7 +1851,7 @@
           <a:lstStyle/>
           <a:p>
             <a:fld id="{CFFD64F9-81CB-D544-9A9C-B48F900B5B35}" type="datetimeFigureOut">
-              <a:t>20/12/15</a:t>
+              <a:t>21/12/15</a:t>
             </a:fld>
             <a:endParaRPr lang="de-DE"/>
           </a:p>
@@ -1944,7 +1944,7 @@
           <a:lstStyle/>
           <a:p>
             <a:fld id="{CFFD64F9-81CB-D544-9A9C-B48F900B5B35}" type="datetimeFigureOut">
-              <a:t>20/12/15</a:t>
+              <a:t>21/12/15</a:t>
             </a:fld>
             <a:endParaRPr lang="de-DE"/>
           </a:p>
@@ -2217,7 +2217,7 @@
           <a:lstStyle/>
           <a:p>
             <a:fld id="{CFFD64F9-81CB-D544-9A9C-B48F900B5B35}" type="datetimeFigureOut">
-              <a:t>20/12/15</a:t>
+              <a:t>21/12/15</a:t>
             </a:fld>
             <a:endParaRPr lang="de-DE"/>
           </a:p>
@@ -2467,7 +2467,7 @@
           <a:lstStyle/>
           <a:p>
             <a:fld id="{CFFD64F9-81CB-D544-9A9C-B48F900B5B35}" type="datetimeFigureOut">
-              <a:t>20/12/15</a:t>
+              <a:t>21/12/15</a:t>
             </a:fld>
             <a:endParaRPr lang="de-DE"/>
           </a:p>
@@ -2676,7 +2676,7 @@
           </a:lstStyle>
           <a:p>
             <a:fld id="{CFFD64F9-81CB-D544-9A9C-B48F900B5B35}" type="datetimeFigureOut">
-              <a:t>20/12/15</a:t>
+              <a:t>21/12/15</a:t>
             </a:fld>
             <a:endParaRPr lang="de-DE"/>
           </a:p>
@@ -3832,6 +3832,360 @@
           </a:p>
         </p:txBody>
       </p:sp>
+      <p:sp>
+        <p:nvSpPr>
+          <p:cNvPr id="26" name="Rechteck 25"/>
+          <p:cNvSpPr/>
+          <p:nvPr/>
+        </p:nvSpPr>
+        <p:spPr>
+          <a:xfrm>
+            <a:off x="2622668" y="731790"/>
+            <a:ext cx="1277597" cy="1277597"/>
+          </a:xfrm>
+          <a:prstGeom prst="rect">
+            <a:avLst/>
+          </a:prstGeom>
+          <a:noFill/>
+          <a:ln>
+            <a:solidFill>
+              <a:schemeClr val="tx1"/>
+            </a:solidFill>
+          </a:ln>
+          <a:effectLst/>
+        </p:spPr>
+        <p:style>
+          <a:lnRef idx="1">
+            <a:schemeClr val="accent1"/>
+          </a:lnRef>
+          <a:fillRef idx="3">
+            <a:schemeClr val="accent1"/>
+          </a:fillRef>
+          <a:effectRef idx="2">
+            <a:schemeClr val="accent1"/>
+          </a:effectRef>
+          <a:fontRef idx="minor">
+            <a:schemeClr val="lt1"/>
+          </a:fontRef>
+        </p:style>
+        <p:txBody>
+          <a:bodyPr rtlCol="0" anchor="ctr"/>
+          <a:lstStyle/>
+          <a:p>
+            <a:pPr algn="ctr"/>
+            <a:endParaRPr lang="de-DE"/>
+          </a:p>
+        </p:txBody>
+      </p:sp>
+      <p:sp>
+        <p:nvSpPr>
+          <p:cNvPr id="6" name="Gleichschenkliges Dreieck 5"/>
+          <p:cNvSpPr/>
+          <p:nvPr/>
+        </p:nvSpPr>
+        <p:spPr>
+          <a:xfrm>
+            <a:off x="2865868" y="1041548"/>
+            <a:ext cx="791198" cy="621274"/>
+          </a:xfrm>
+          <a:prstGeom prst="triangle">
+            <a:avLst/>
+          </a:prstGeom>
+          <a:solidFill>
+            <a:schemeClr val="accent6">
+              <a:lumMod val="50000"/>
+              <a:alpha val="80000"/>
+            </a:schemeClr>
+          </a:solidFill>
+          <a:ln>
+            <a:noFill/>
+          </a:ln>
+          <a:effectLst/>
+        </p:spPr>
+        <p:style>
+          <a:lnRef idx="1">
+            <a:schemeClr val="accent1"/>
+          </a:lnRef>
+          <a:fillRef idx="3">
+            <a:schemeClr val="accent1"/>
+          </a:fillRef>
+          <a:effectRef idx="2">
+            <a:schemeClr val="accent1"/>
+          </a:effectRef>
+          <a:fontRef idx="minor">
+            <a:schemeClr val="lt1"/>
+          </a:fontRef>
+        </p:style>
+        <p:txBody>
+          <a:bodyPr rtlCol="0" anchor="ctr"/>
+          <a:lstStyle/>
+          <a:p>
+            <a:pPr algn="ctr"/>
+            <a:endParaRPr lang="de-DE"/>
+          </a:p>
+        </p:txBody>
+      </p:sp>
+      <p:sp>
+        <p:nvSpPr>
+          <p:cNvPr id="29" name="Rechteck 28"/>
+          <p:cNvSpPr/>
+          <p:nvPr/>
+        </p:nvSpPr>
+        <p:spPr>
+          <a:xfrm>
+            <a:off x="4218529" y="728254"/>
+            <a:ext cx="1277597" cy="1277597"/>
+          </a:xfrm>
+          <a:prstGeom prst="rect">
+            <a:avLst/>
+          </a:prstGeom>
+          <a:noFill/>
+          <a:ln>
+            <a:solidFill>
+              <a:schemeClr val="tx1"/>
+            </a:solidFill>
+          </a:ln>
+          <a:effectLst/>
+        </p:spPr>
+        <p:style>
+          <a:lnRef idx="1">
+            <a:schemeClr val="accent1"/>
+          </a:lnRef>
+          <a:fillRef idx="3">
+            <a:schemeClr val="accent1"/>
+          </a:fillRef>
+          <a:effectRef idx="2">
+            <a:schemeClr val="accent1"/>
+          </a:effectRef>
+          <a:fontRef idx="minor">
+            <a:schemeClr val="lt1"/>
+          </a:fontRef>
+        </p:style>
+        <p:txBody>
+          <a:bodyPr rtlCol="0" anchor="ctr"/>
+          <a:lstStyle/>
+          <a:p>
+            <a:pPr algn="ctr"/>
+            <a:endParaRPr lang="de-DE"/>
+          </a:p>
+        </p:txBody>
+      </p:sp>
+      <p:sp>
+        <p:nvSpPr>
+          <p:cNvPr id="30" name="Gleichschenkliges Dreieck 29"/>
+          <p:cNvSpPr/>
+          <p:nvPr/>
+        </p:nvSpPr>
+        <p:spPr>
+          <a:xfrm>
+            <a:off x="4291728" y="883975"/>
+            <a:ext cx="791198" cy="621274"/>
+          </a:xfrm>
+          <a:prstGeom prst="triangle">
+            <a:avLst/>
+          </a:prstGeom>
+          <a:solidFill>
+            <a:schemeClr val="accent6">
+              <a:lumMod val="50000"/>
+              <a:alpha val="80000"/>
+            </a:schemeClr>
+          </a:solidFill>
+          <a:ln>
+            <a:noFill/>
+          </a:ln>
+          <a:effectLst/>
+        </p:spPr>
+        <p:style>
+          <a:lnRef idx="1">
+            <a:schemeClr val="accent1"/>
+          </a:lnRef>
+          <a:fillRef idx="3">
+            <a:schemeClr val="accent1"/>
+          </a:fillRef>
+          <a:effectRef idx="2">
+            <a:schemeClr val="accent1"/>
+          </a:effectRef>
+          <a:fontRef idx="minor">
+            <a:schemeClr val="lt1"/>
+          </a:fontRef>
+        </p:style>
+        <p:txBody>
+          <a:bodyPr rtlCol="0" anchor="ctr"/>
+          <a:lstStyle/>
+          <a:p>
+            <a:pPr algn="ctr"/>
+            <a:endParaRPr lang="de-DE"/>
+          </a:p>
+        </p:txBody>
+      </p:sp>
+      <p:sp>
+        <p:nvSpPr>
+          <p:cNvPr id="31" name="Gleichschenkliges Dreieck 30"/>
+          <p:cNvSpPr/>
+          <p:nvPr/>
+        </p:nvSpPr>
+        <p:spPr>
+          <a:xfrm>
+            <a:off x="4462402" y="1036375"/>
+            <a:ext cx="791198" cy="621274"/>
+          </a:xfrm>
+          <a:prstGeom prst="triangle">
+            <a:avLst/>
+          </a:prstGeom>
+          <a:solidFill>
+            <a:schemeClr val="accent6">
+              <a:lumMod val="50000"/>
+              <a:alpha val="80000"/>
+            </a:schemeClr>
+          </a:solidFill>
+          <a:ln>
+            <a:noFill/>
+          </a:ln>
+          <a:effectLst/>
+        </p:spPr>
+        <p:style>
+          <a:lnRef idx="1">
+            <a:schemeClr val="accent1"/>
+          </a:lnRef>
+          <a:fillRef idx="3">
+            <a:schemeClr val="accent1"/>
+          </a:fillRef>
+          <a:effectRef idx="2">
+            <a:schemeClr val="accent1"/>
+          </a:effectRef>
+          <a:fontRef idx="minor">
+            <a:schemeClr val="lt1"/>
+          </a:fontRef>
+        </p:style>
+        <p:txBody>
+          <a:bodyPr rtlCol="0" anchor="ctr"/>
+          <a:lstStyle/>
+          <a:p>
+            <a:pPr algn="ctr"/>
+            <a:endParaRPr lang="de-DE"/>
+          </a:p>
+        </p:txBody>
+      </p:sp>
+      <p:sp>
+        <p:nvSpPr>
+          <p:cNvPr id="32" name="Gleichschenkliges Dreieck 31"/>
+          <p:cNvSpPr/>
+          <p:nvPr/>
+        </p:nvSpPr>
+        <p:spPr>
+          <a:xfrm>
+            <a:off x="4638177" y="1188775"/>
+            <a:ext cx="791198" cy="621274"/>
+          </a:xfrm>
+          <a:prstGeom prst="triangle">
+            <a:avLst/>
+          </a:prstGeom>
+          <a:solidFill>
+            <a:schemeClr val="accent6">
+              <a:lumMod val="50000"/>
+              <a:alpha val="80000"/>
+            </a:schemeClr>
+          </a:solidFill>
+          <a:ln>
+            <a:noFill/>
+          </a:ln>
+          <a:effectLst/>
+        </p:spPr>
+        <p:style>
+          <a:lnRef idx="1">
+            <a:schemeClr val="accent1"/>
+          </a:lnRef>
+          <a:fillRef idx="3">
+            <a:schemeClr val="accent1"/>
+          </a:fillRef>
+          <a:effectRef idx="2">
+            <a:schemeClr val="accent1"/>
+          </a:effectRef>
+          <a:fontRef idx="minor">
+            <a:schemeClr val="lt1"/>
+          </a:fontRef>
+        </p:style>
+        <p:txBody>
+          <a:bodyPr rtlCol="0" anchor="ctr"/>
+          <a:lstStyle/>
+          <a:p>
+            <a:pPr algn="ctr"/>
+            <a:endParaRPr lang="de-DE"/>
+          </a:p>
+        </p:txBody>
+      </p:sp>
+      <p:cxnSp>
+        <p:nvCxnSpPr>
+          <p:cNvPr id="8" name="Gerade Verbindung 7"/>
+          <p:cNvCxnSpPr/>
+          <p:nvPr/>
+        </p:nvCxnSpPr>
+        <p:spPr>
+          <a:xfrm flipV="1">
+            <a:off x="4561221" y="1116968"/>
+            <a:ext cx="253522" cy="367882"/>
+          </a:xfrm>
+          <a:prstGeom prst="line">
+            <a:avLst/>
+          </a:prstGeom>
+          <a:ln>
+            <a:solidFill>
+              <a:schemeClr val="tx1"/>
+            </a:solidFill>
+          </a:ln>
+          <a:effectLst/>
+        </p:spPr>
+        <p:style>
+          <a:lnRef idx="2">
+            <a:schemeClr val="accent1"/>
+          </a:lnRef>
+          <a:fillRef idx="0">
+            <a:schemeClr val="accent1"/>
+          </a:fillRef>
+          <a:effectRef idx="1">
+            <a:schemeClr val="accent1"/>
+          </a:effectRef>
+          <a:fontRef idx="minor">
+            <a:schemeClr val="tx1"/>
+          </a:fontRef>
+        </p:style>
+      </p:cxnSp>
+      <p:cxnSp>
+        <p:nvCxnSpPr>
+          <p:cNvPr id="33" name="Gerade Verbindung 32"/>
+          <p:cNvCxnSpPr/>
+          <p:nvPr/>
+        </p:nvCxnSpPr>
+        <p:spPr>
+          <a:xfrm flipV="1">
+            <a:off x="4734025" y="1269368"/>
+            <a:ext cx="253522" cy="367882"/>
+          </a:xfrm>
+          <a:prstGeom prst="line">
+            <a:avLst/>
+          </a:prstGeom>
+          <a:ln>
+            <a:solidFill>
+              <a:schemeClr val="tx1"/>
+            </a:solidFill>
+          </a:ln>
+          <a:effectLst/>
+        </p:spPr>
+        <p:style>
+          <a:lnRef idx="2">
+            <a:schemeClr val="accent1"/>
+          </a:lnRef>
+          <a:fillRef idx="0">
+            <a:schemeClr val="accent1"/>
+          </a:fillRef>
+          <a:effectRef idx="1">
+            <a:schemeClr val="accent1"/>
+          </a:effectRef>
+          <a:fontRef idx="minor">
+            <a:schemeClr val="tx1"/>
+          </a:fontRef>
+        </p:style>
+      </p:cxnSp>
     </p:spTree>
     <p:extLst>
       <p:ext uri="{BB962C8B-B14F-4D97-AF65-F5344CB8AC3E}">

</xml_diff>

<commit_message>
extension between data items
</commit_message>
<xml_diff>
--- a/code/languages/org.iets3.core/languages/org.iets3.components.core/icons/icons.pptx
+++ b/code/languages/org.iets3.core/languages/org.iets3.components.core/icons/icons.pptx
@@ -4186,6 +4186,179 @@
           </a:fontRef>
         </p:style>
       </p:cxnSp>
+      <p:pic>
+        <p:nvPicPr>
+          <p:cNvPr id="14" name="Bild 13" descr="service.png"/>
+          <p:cNvPicPr>
+            <a:picLocks noChangeAspect="1"/>
+          </p:cNvPicPr>
+          <p:nvPr/>
+        </p:nvPicPr>
+        <p:blipFill>
+          <a:blip r:embed="rId3">
+            <a:duotone>
+              <a:schemeClr val="accent3">
+                <a:shade val="45000"/>
+                <a:satMod val="135000"/>
+              </a:schemeClr>
+              <a:prstClr val="white"/>
+            </a:duotone>
+            <a:extLst>
+              <a:ext uri="{BEBA8EAE-BF5A-486C-A8C5-ECC9F3942E4B}">
+                <a14:imgProps xmlns:a14="http://schemas.microsoft.com/office/drawing/2010/main">
+                  <a14:imgLayer r:embed="rId4">
+                    <a14:imgEffect>
+                      <a14:brightnessContrast bright="-40000" contrast="-40000"/>
+                    </a14:imgEffect>
+                  </a14:imgLayer>
+                </a14:imgProps>
+              </a:ext>
+              <a:ext uri="{28A0092B-C50C-407E-A947-70E740481C1C}">
+                <a14:useLocalDpi xmlns:a14="http://schemas.microsoft.com/office/drawing/2010/main" val="0"/>
+              </a:ext>
+            </a:extLst>
+          </a:blip>
+          <a:stretch>
+            <a:fillRect/>
+          </a:stretch>
+        </p:blipFill>
+        <p:spPr>
+          <a:xfrm>
+            <a:off x="5931933" y="868712"/>
+            <a:ext cx="999706" cy="999276"/>
+          </a:xfrm>
+          <a:prstGeom prst="rect">
+            <a:avLst/>
+          </a:prstGeom>
+        </p:spPr>
+      </p:pic>
+      <p:sp>
+        <p:nvSpPr>
+          <p:cNvPr id="34" name="Rechteck 33"/>
+          <p:cNvSpPr/>
+          <p:nvPr/>
+        </p:nvSpPr>
+        <p:spPr>
+          <a:xfrm>
+            <a:off x="5786862" y="728254"/>
+            <a:ext cx="1277597" cy="1277597"/>
+          </a:xfrm>
+          <a:prstGeom prst="rect">
+            <a:avLst/>
+          </a:prstGeom>
+          <a:noFill/>
+          <a:ln>
+            <a:solidFill>
+              <a:schemeClr val="tx1"/>
+            </a:solidFill>
+          </a:ln>
+          <a:effectLst/>
+        </p:spPr>
+        <p:style>
+          <a:lnRef idx="1">
+            <a:schemeClr val="accent1"/>
+          </a:lnRef>
+          <a:fillRef idx="3">
+            <a:schemeClr val="accent1"/>
+          </a:fillRef>
+          <a:effectRef idx="2">
+            <a:schemeClr val="accent1"/>
+          </a:effectRef>
+          <a:fontRef idx="minor">
+            <a:schemeClr val="lt1"/>
+          </a:fontRef>
+        </p:style>
+        <p:txBody>
+          <a:bodyPr rtlCol="0" anchor="ctr"/>
+          <a:lstStyle/>
+          <a:p>
+            <a:pPr algn="ctr"/>
+            <a:endParaRPr lang="de-DE"/>
+          </a:p>
+        </p:txBody>
+      </p:sp>
+      <p:sp>
+        <p:nvSpPr>
+          <p:cNvPr id="35" name="Rechteck 34"/>
+          <p:cNvSpPr/>
+          <p:nvPr/>
+        </p:nvSpPr>
+        <p:spPr>
+          <a:xfrm>
+            <a:off x="7367414" y="732611"/>
+            <a:ext cx="1277597" cy="1277597"/>
+          </a:xfrm>
+          <a:prstGeom prst="rect">
+            <a:avLst/>
+          </a:prstGeom>
+          <a:noFill/>
+          <a:ln>
+            <a:solidFill>
+              <a:schemeClr val="tx1"/>
+            </a:solidFill>
+          </a:ln>
+          <a:effectLst/>
+        </p:spPr>
+        <p:style>
+          <a:lnRef idx="1">
+            <a:schemeClr val="accent1"/>
+          </a:lnRef>
+          <a:fillRef idx="3">
+            <a:schemeClr val="accent1"/>
+          </a:fillRef>
+          <a:effectRef idx="2">
+            <a:schemeClr val="accent1"/>
+          </a:effectRef>
+          <a:fontRef idx="minor">
+            <a:schemeClr val="lt1"/>
+          </a:fontRef>
+        </p:style>
+        <p:txBody>
+          <a:bodyPr rtlCol="0" anchor="ctr"/>
+          <a:lstStyle/>
+          <a:p>
+            <a:pPr algn="ctr"/>
+            <a:endParaRPr lang="de-DE"/>
+          </a:p>
+        </p:txBody>
+      </p:sp>
+      <p:pic>
+        <p:nvPicPr>
+          <p:cNvPr id="18" name="Bild 17" descr="conponent.jpeg"/>
+          <p:cNvPicPr>
+            <a:picLocks noChangeAspect="1"/>
+          </p:cNvPicPr>
+          <p:nvPr/>
+        </p:nvPicPr>
+        <p:blipFill>
+          <a:blip r:embed="rId5">
+            <a:duotone>
+              <a:schemeClr val="accent1">
+                <a:shade val="45000"/>
+                <a:satMod val="135000"/>
+              </a:schemeClr>
+              <a:prstClr val="white"/>
+            </a:duotone>
+            <a:extLst>
+              <a:ext uri="{28A0092B-C50C-407E-A947-70E740481C1C}">
+                <a14:useLocalDpi xmlns:a14="http://schemas.microsoft.com/office/drawing/2010/main" val="0"/>
+              </a:ext>
+            </a:extLst>
+          </a:blip>
+          <a:stretch>
+            <a:fillRect/>
+          </a:stretch>
+        </p:blipFill>
+        <p:spPr>
+          <a:xfrm>
+            <a:off x="7512349" y="847917"/>
+            <a:ext cx="1062711" cy="1146350"/>
+          </a:xfrm>
+          <a:prstGeom prst="rect">
+            <a:avLst/>
+          </a:prstGeom>
+        </p:spPr>
+      </p:pic>
     </p:spTree>
     <p:extLst>
       <p:ext uri="{BB962C8B-B14F-4D97-AF65-F5344CB8AC3E}">

</xml_diff>